<commit_message>
finalized lab 1 files
</commit_message>
<xml_diff>
--- a/Lab 1- Sept 8/Intro Slides.pptx
+++ b/Lab 1- Sept 8/Intro Slides.pptx
@@ -5,7 +5,7 @@
     <p:sldMasterId id="2147483659" r:id="rId1"/>
   </p:sldMasterIdLst>
   <p:notesMasterIdLst>
-    <p:notesMasterId r:id="rId9"/>
+    <p:notesMasterId r:id="rId10"/>
   </p:notesMasterIdLst>
   <p:sldIdLst>
     <p:sldId id="256" r:id="rId2"/>
@@ -14,34 +14,35 @@
     <p:sldId id="259" r:id="rId5"/>
     <p:sldId id="261" r:id="rId6"/>
     <p:sldId id="262" r:id="rId7"/>
-    <p:sldId id="266" r:id="rId8"/>
+    <p:sldId id="268" r:id="rId8"/>
+    <p:sldId id="266" r:id="rId9"/>
   </p:sldIdLst>
   <p:sldSz cx="9144000" cy="5143500" type="screen16x9"/>
   <p:notesSz cx="6858000" cy="9144000"/>
   <p:embeddedFontLst>
     <p:embeddedFont>
       <p:font typeface="Comfortaa" panose="020B0604020202020204" charset="0"/>
-      <p:regular r:id="rId10"/>
-      <p:bold r:id="rId11"/>
+      <p:regular r:id="rId11"/>
+      <p:bold r:id="rId12"/>
     </p:embeddedFont>
     <p:embeddedFont>
       <p:font typeface="Montserrat" panose="020B0604020202020204" charset="0"/>
-      <p:regular r:id="rId12"/>
-      <p:bold r:id="rId13"/>
-      <p:italic r:id="rId14"/>
-      <p:boldItalic r:id="rId15"/>
+      <p:regular r:id="rId13"/>
+      <p:bold r:id="rId14"/>
+      <p:italic r:id="rId15"/>
+      <p:boldItalic r:id="rId16"/>
     </p:embeddedFont>
     <p:embeddedFont>
       <p:font typeface="Oswald" panose="020B0604020202020204" charset="0"/>
-      <p:regular r:id="rId16"/>
-      <p:bold r:id="rId17"/>
+      <p:regular r:id="rId17"/>
+      <p:bold r:id="rId18"/>
     </p:embeddedFont>
     <p:embeddedFont>
       <p:font typeface="Playfair Display" panose="020B0604020202020204" charset="0"/>
-      <p:regular r:id="rId18"/>
-      <p:bold r:id="rId19"/>
-      <p:italic r:id="rId20"/>
-      <p:boldItalic r:id="rId21"/>
+      <p:regular r:id="rId19"/>
+      <p:bold r:id="rId20"/>
+      <p:italic r:id="rId21"/>
+      <p:boldItalic r:id="rId22"/>
     </p:embeddedFont>
   </p:embeddedFontLst>
   <p:defaultTextStyle>
@@ -1358,6 +1359,115 @@
 </file>
 
 <file path=ppt/notesSlides/notesSlide7.xml><?xml version="1.0" encoding="utf-8"?>
+<p:notes xmlns:a="http://schemas.openxmlformats.org/drawingml/2006/main" xmlns:r="http://schemas.openxmlformats.org/officeDocument/2006/relationships" xmlns:p="http://schemas.openxmlformats.org/presentationml/2006/main" showMasterSp="0" showMasterPhAnim="0">
+  <p:cSld>
+    <p:spTree>
+      <p:nvGrpSpPr>
+        <p:cNvPr id="1" name="Shape 54"/>
+        <p:cNvGrpSpPr/>
+        <p:nvPr/>
+      </p:nvGrpSpPr>
+      <p:grpSpPr>
+        <a:xfrm>
+          <a:off x="0" y="0"/>
+          <a:ext cx="0" cy="0"/>
+          <a:chOff x="0" y="0"/>
+          <a:chExt cx="0" cy="0"/>
+        </a:xfrm>
+      </p:grpSpPr>
+      <p:sp>
+        <p:nvSpPr>
+          <p:cNvPr id="55" name="Google Shape;55;p:notes"/>
+          <p:cNvSpPr>
+            <a:spLocks noGrp="1" noRot="1" noChangeAspect="1"/>
+          </p:cNvSpPr>
+          <p:nvPr>
+            <p:ph type="sldImg" idx="2"/>
+          </p:nvPr>
+        </p:nvSpPr>
+        <p:spPr>
+          <a:xfrm>
+            <a:off x="381000" y="685800"/>
+            <a:ext cx="6096000" cy="3429000"/>
+          </a:xfrm>
+          <a:custGeom>
+            <a:avLst/>
+            <a:gdLst/>
+            <a:ahLst/>
+            <a:cxnLst/>
+            <a:rect l="l" t="t" r="r" b="b"/>
+            <a:pathLst>
+              <a:path w="120000" h="120000" extrusionOk="0">
+                <a:moveTo>
+                  <a:pt x="0" y="0"/>
+                </a:moveTo>
+                <a:lnTo>
+                  <a:pt x="120000" y="0"/>
+                </a:lnTo>
+                <a:lnTo>
+                  <a:pt x="120000" y="120000"/>
+                </a:lnTo>
+                <a:lnTo>
+                  <a:pt x="0" y="120000"/>
+                </a:lnTo>
+                <a:close/>
+              </a:path>
+            </a:pathLst>
+          </a:custGeom>
+        </p:spPr>
+      </p:sp>
+      <p:sp>
+        <p:nvSpPr>
+          <p:cNvPr id="56" name="Google Shape;56;p:notes"/>
+          <p:cNvSpPr txBox="1">
+            <a:spLocks noGrp="1"/>
+          </p:cNvSpPr>
+          <p:nvPr>
+            <p:ph type="body" idx="1"/>
+          </p:nvPr>
+        </p:nvSpPr>
+        <p:spPr>
+          <a:xfrm>
+            <a:off x="685800" y="4343400"/>
+            <a:ext cx="5486400" cy="4114800"/>
+          </a:xfrm>
+          <a:prstGeom prst="rect">
+            <a:avLst/>
+          </a:prstGeom>
+        </p:spPr>
+        <p:txBody>
+          <a:bodyPr spcFirstLastPara="1" wrap="square" lIns="91425" tIns="91425" rIns="91425" bIns="91425" anchor="t" anchorCtr="0">
+            <a:noAutofit/>
+          </a:bodyPr>
+          <a:lstStyle/>
+          <a:p>
+            <a:pPr marL="0" lvl="0" indent="0" algn="l" rtl="0">
+              <a:spcBef>
+                <a:spcPts val="0"/>
+              </a:spcBef>
+              <a:spcAft>
+                <a:spcPts val="0"/>
+              </a:spcAft>
+              <a:buNone/>
+            </a:pPr>
+            <a:endParaRPr/>
+          </a:p>
+        </p:txBody>
+      </p:sp>
+    </p:spTree>
+    <p:extLst>
+      <p:ext uri="{BB962C8B-B14F-4D97-AF65-F5344CB8AC3E}">
+        <p14:creationId xmlns:p14="http://schemas.microsoft.com/office/powerpoint/2010/main" val="1702871049"/>
+      </p:ext>
+    </p:extLst>
+  </p:cSld>
+  <p:clrMapOvr>
+    <a:masterClrMapping/>
+  </p:clrMapOvr>
+</p:notes>
+</file>
+
+<file path=ppt/notesSlides/notesSlide8.xml><?xml version="1.0" encoding="utf-8"?>
 <p:notes xmlns:a="http://schemas.openxmlformats.org/drawingml/2006/main" xmlns:r="http://schemas.openxmlformats.org/officeDocument/2006/relationships" xmlns:p="http://schemas.openxmlformats.org/presentationml/2006/main" showMasterSp="0" showMasterPhAnim="0">
   <p:cSld>
     <p:spTree>
@@ -6988,7 +7098,7 @@
             </a:pPr>
             <a:r>
               <a:rPr lang="en" dirty="0"/>
-              <a:t>Things about lab:</a:t>
+              <a:t>ABOUT LAB:</a:t>
             </a:r>
             <a:endParaRPr dirty="0"/>
           </a:p>
@@ -7933,6 +8043,585 @@
 </file>
 
 <file path=ppt/slides/slide7.xml><?xml version="1.0" encoding="utf-8"?>
+<p:sld xmlns:a="http://schemas.openxmlformats.org/drawingml/2006/main" xmlns:r="http://schemas.openxmlformats.org/officeDocument/2006/relationships" xmlns:p="http://schemas.openxmlformats.org/presentationml/2006/main">
+  <p:cSld>
+    <p:spTree>
+      <p:nvGrpSpPr>
+        <p:cNvPr id="1" name="Shape 57"/>
+        <p:cNvGrpSpPr/>
+        <p:nvPr/>
+      </p:nvGrpSpPr>
+      <p:grpSpPr>
+        <a:xfrm>
+          <a:off x="0" y="0"/>
+          <a:ext cx="0" cy="0"/>
+          <a:chOff x="0" y="0"/>
+          <a:chExt cx="0" cy="0"/>
+        </a:xfrm>
+      </p:grpSpPr>
+      <p:sp>
+        <p:nvSpPr>
+          <p:cNvPr id="8" name="Google Shape;78;p16">
+            <a:extLst>
+              <a:ext uri="{FF2B5EF4-FFF2-40B4-BE49-F238E27FC236}">
+                <a16:creationId xmlns:a16="http://schemas.microsoft.com/office/drawing/2014/main" id="{42176FC9-CF23-413C-9529-3873621DFDFA}"/>
+              </a:ext>
+            </a:extLst>
+          </p:cNvPr>
+          <p:cNvSpPr txBox="1"/>
+          <p:nvPr/>
+        </p:nvSpPr>
+        <p:spPr>
+          <a:xfrm>
+            <a:off x="4356846" y="1019313"/>
+            <a:ext cx="3738283" cy="2631459"/>
+          </a:xfrm>
+          <a:prstGeom prst="rect">
+            <a:avLst/>
+          </a:prstGeom>
+          <a:noFill/>
+          <a:ln>
+            <a:noFill/>
+          </a:ln>
+        </p:spPr>
+        <p:txBody>
+          <a:bodyPr spcFirstLastPara="1" wrap="square" lIns="91425" tIns="91425" rIns="91425" bIns="91425" anchor="t" anchorCtr="0">
+            <a:spAutoFit/>
+          </a:bodyPr>
+          <a:lstStyle/>
+          <a:p>
+            <a:pPr marL="438150" lvl="0" indent="-285750" algn="l" rtl="0">
+              <a:spcBef>
+                <a:spcPts val="0"/>
+              </a:spcBef>
+              <a:spcAft>
+                <a:spcPts val="600"/>
+              </a:spcAft>
+              <a:buClr>
+                <a:srgbClr val="000000"/>
+              </a:buClr>
+              <a:buSzPts val="1200"/>
+              <a:buFont typeface="Arial" panose="020B0604020202020204" pitchFamily="34" charset="0"/>
+              <a:buChar char="•"/>
+            </a:pPr>
+            <a:r>
+              <a:rPr lang="en-US" sz="1800" dirty="0">
+                <a:latin typeface="Comfortaa"/>
+                <a:ea typeface="Comfortaa"/>
+                <a:cs typeface="Comfortaa"/>
+                <a:sym typeface="Comfortaa"/>
+              </a:rPr>
+              <a:t>Book: FREE!!! </a:t>
+            </a:r>
+            <a:r>
+              <a:rPr lang="en-US" sz="1800" dirty="0">
+                <a:solidFill>
+                  <a:srgbClr val="FFFF00"/>
+                </a:solidFill>
+                <a:latin typeface="Comfortaa"/>
+                <a:ea typeface="Comfortaa"/>
+                <a:cs typeface="Comfortaa"/>
+                <a:sym typeface="Comfortaa"/>
+                <a:hlinkClick r:id="rId3">
+                  <a:extLst>
+                    <a:ext uri="{A12FA001-AC4F-418D-AE19-62706E023703}">
+                      <ahyp:hlinkClr xmlns:ahyp="http://schemas.microsoft.com/office/drawing/2018/hyperlinkcolor" val="tx"/>
+                    </a:ext>
+                  </a:extLst>
+                </a:hlinkClick>
+              </a:rPr>
+              <a:t>https://r4ds.had.co.nz/</a:t>
+            </a:r>
+            <a:endParaRPr lang="en-US" sz="1800" dirty="0">
+              <a:solidFill>
+                <a:srgbClr val="FFFF00"/>
+              </a:solidFill>
+              <a:latin typeface="Comfortaa"/>
+              <a:ea typeface="Comfortaa"/>
+              <a:cs typeface="Comfortaa"/>
+              <a:sym typeface="Comfortaa"/>
+            </a:endParaRPr>
+          </a:p>
+          <a:p>
+            <a:pPr marL="438150" lvl="0" indent="-285750" algn="l" rtl="0">
+              <a:spcBef>
+                <a:spcPts val="0"/>
+              </a:spcBef>
+              <a:spcAft>
+                <a:spcPts val="600"/>
+              </a:spcAft>
+              <a:buClr>
+                <a:srgbClr val="000000"/>
+              </a:buClr>
+              <a:buSzPts val="1200"/>
+              <a:buFont typeface="Arial" panose="020B0604020202020204" pitchFamily="34" charset="0"/>
+              <a:buChar char="•"/>
+            </a:pPr>
+            <a:r>
+              <a:rPr lang="en-US" sz="1800" b="0" i="0" u="none" strike="noStrike">
+                <a:solidFill>
+                  <a:srgbClr val="212121"/>
+                </a:solidFill>
+                <a:effectLst/>
+                <a:latin typeface="Comfortaa" panose="020B0604020202020204" charset="0"/>
+              </a:rPr>
+              <a:t>R </a:t>
+            </a:r>
+            <a:r>
+              <a:rPr lang="en-US" sz="1800" b="0" i="0" u="none" strike="noStrike" dirty="0">
+                <a:solidFill>
+                  <a:srgbClr val="212121"/>
+                </a:solidFill>
+                <a:effectLst/>
+                <a:latin typeface="Comfortaa" panose="020B0604020202020204" charset="0"/>
+              </a:rPr>
+              <a:t>Style Guide:</a:t>
+            </a:r>
+            <a:r>
+              <a:rPr lang="en-US" sz="1800" b="0" i="0" u="none" strike="noStrike" dirty="0">
+                <a:solidFill>
+                  <a:srgbClr val="0F9D58"/>
+                </a:solidFill>
+                <a:effectLst/>
+                <a:latin typeface="Comfortaa" panose="020B0604020202020204" charset="0"/>
+                <a:hlinkClick r:id="rId4">
+                  <a:extLst>
+                    <a:ext uri="{A12FA001-AC4F-418D-AE19-62706E023703}">
+                      <ahyp:hlinkClr xmlns:ahyp="http://schemas.microsoft.com/office/drawing/2018/hyperlinkcolor" val="tx"/>
+                    </a:ext>
+                  </a:extLst>
+                </a:hlinkClick>
+              </a:rPr>
+              <a:t> </a:t>
+            </a:r>
+            <a:r>
+              <a:rPr lang="en-US" sz="1800" b="0" i="0" u="sng" strike="noStrike" dirty="0">
+                <a:solidFill>
+                  <a:srgbClr val="FFFF00"/>
+                </a:solidFill>
+                <a:effectLst/>
+                <a:latin typeface="Comfortaa" panose="020B0604020202020204" charset="0"/>
+                <a:hlinkClick r:id="rId4">
+                  <a:extLst>
+                    <a:ext uri="{A12FA001-AC4F-418D-AE19-62706E023703}">
+                      <ahyp:hlinkClr xmlns:ahyp="http://schemas.microsoft.com/office/drawing/2018/hyperlinkcolor" val="tx"/>
+                    </a:ext>
+                  </a:extLst>
+                </a:hlinkClick>
+              </a:rPr>
+              <a:t>https://style.tidyverse.org</a:t>
+            </a:r>
+            <a:r>
+              <a:rPr lang="en-US" sz="1800" b="0" i="0" u="none" strike="noStrike" dirty="0">
+                <a:solidFill>
+                  <a:srgbClr val="FFFF00"/>
+                </a:solidFill>
+                <a:effectLst/>
+                <a:latin typeface="Comfortaa" panose="020B0604020202020204" charset="0"/>
+              </a:rPr>
+              <a:t>/</a:t>
+            </a:r>
+            <a:endParaRPr lang="en-US" sz="1800" dirty="0">
+              <a:solidFill>
+                <a:srgbClr val="FFFF00"/>
+              </a:solidFill>
+              <a:latin typeface="Comfortaa"/>
+              <a:ea typeface="Comfortaa"/>
+              <a:cs typeface="Comfortaa"/>
+              <a:sym typeface="Comfortaa"/>
+            </a:endParaRPr>
+          </a:p>
+          <a:p>
+            <a:pPr marL="438150" lvl="0" indent="-285750" algn="l" rtl="0">
+              <a:spcBef>
+                <a:spcPts val="0"/>
+              </a:spcBef>
+              <a:spcAft>
+                <a:spcPts val="600"/>
+              </a:spcAft>
+              <a:buClr>
+                <a:srgbClr val="000000"/>
+              </a:buClr>
+              <a:buSzPts val="1200"/>
+              <a:buFont typeface="Arial" panose="020B0604020202020204" pitchFamily="34" charset="0"/>
+              <a:buChar char="•"/>
+            </a:pPr>
+            <a:r>
+              <a:rPr lang="en-US" sz="1800" dirty="0">
+                <a:latin typeface="Comfortaa"/>
+                <a:ea typeface="Comfortaa"/>
+                <a:cs typeface="Comfortaa"/>
+                <a:sym typeface="Comfortaa"/>
+              </a:rPr>
+              <a:t>R </a:t>
+            </a:r>
+            <a:r>
+              <a:rPr lang="en-US" sz="1800" dirty="0" err="1">
+                <a:latin typeface="Comfortaa"/>
+                <a:ea typeface="Comfortaa"/>
+                <a:cs typeface="Comfortaa"/>
+                <a:sym typeface="Comfortaa"/>
+              </a:rPr>
+              <a:t>Cheatsheets</a:t>
+            </a:r>
+            <a:r>
+              <a:rPr lang="en-US" sz="1800" dirty="0">
+                <a:latin typeface="Comfortaa"/>
+                <a:ea typeface="Comfortaa"/>
+                <a:cs typeface="Comfortaa"/>
+                <a:sym typeface="Comfortaa"/>
+              </a:rPr>
+              <a:t> </a:t>
+            </a:r>
+            <a:r>
+              <a:rPr lang="en-US" sz="1800" dirty="0">
+                <a:solidFill>
+                  <a:srgbClr val="FFFF00"/>
+                </a:solidFill>
+                <a:latin typeface="Comfortaa"/>
+                <a:ea typeface="Comfortaa"/>
+                <a:cs typeface="Comfortaa"/>
+                <a:sym typeface="Comfortaa"/>
+                <a:hlinkClick r:id="rId5">
+                  <a:extLst>
+                    <a:ext uri="{A12FA001-AC4F-418D-AE19-62706E023703}">
+                      <ahyp:hlinkClr xmlns:ahyp="http://schemas.microsoft.com/office/drawing/2018/hyperlinkcolor" val="tx"/>
+                    </a:ext>
+                  </a:extLst>
+                </a:hlinkClick>
+              </a:rPr>
+              <a:t>https://www.rstudio.com/resources/cheatsheets/</a:t>
+            </a:r>
+            <a:endParaRPr lang="en-US" sz="1800" dirty="0">
+              <a:solidFill>
+                <a:srgbClr val="FFFF00"/>
+              </a:solidFill>
+              <a:latin typeface="Comfortaa"/>
+              <a:ea typeface="Comfortaa"/>
+              <a:cs typeface="Comfortaa"/>
+              <a:sym typeface="Comfortaa"/>
+            </a:endParaRPr>
+          </a:p>
+        </p:txBody>
+      </p:sp>
+      <p:sp>
+        <p:nvSpPr>
+          <p:cNvPr id="9" name="Google Shape;59;p13">
+            <a:extLst>
+              <a:ext uri="{FF2B5EF4-FFF2-40B4-BE49-F238E27FC236}">
+                <a16:creationId xmlns:a16="http://schemas.microsoft.com/office/drawing/2014/main" id="{EFA74635-5158-4CE0-9DA4-EB7EEB9CBF6E}"/>
+              </a:ext>
+            </a:extLst>
+          </p:cNvPr>
+          <p:cNvSpPr txBox="1">
+            <a:spLocks noGrp="1"/>
+          </p:cNvSpPr>
+          <p:nvPr>
+            <p:ph type="subTitle" idx="1"/>
+          </p:nvPr>
+        </p:nvSpPr>
+        <p:spPr>
+          <a:xfrm>
+            <a:off x="440250" y="386173"/>
+            <a:ext cx="4910100" cy="577800"/>
+          </a:xfrm>
+          <a:prstGeom prst="rect">
+            <a:avLst/>
+          </a:prstGeom>
+        </p:spPr>
+        <p:txBody>
+          <a:bodyPr spcFirstLastPara="1" wrap="square" lIns="91425" tIns="91425" rIns="91425" bIns="91425" anchor="ctr" anchorCtr="0">
+            <a:normAutofit/>
+          </a:bodyPr>
+          <a:lstStyle/>
+          <a:p>
+            <a:pPr marL="0" lvl="0" indent="0" algn="l" rtl="0">
+              <a:spcBef>
+                <a:spcPts val="0"/>
+              </a:spcBef>
+              <a:spcAft>
+                <a:spcPts val="0"/>
+              </a:spcAft>
+              <a:buNone/>
+            </a:pPr>
+            <a:r>
+              <a:rPr lang="en" dirty="0"/>
+              <a:t>Helpful Links</a:t>
+            </a:r>
+            <a:endParaRPr dirty="0"/>
+          </a:p>
+        </p:txBody>
+      </p:sp>
+      <p:sp>
+        <p:nvSpPr>
+          <p:cNvPr id="10" name="Google Shape;78;p16">
+            <a:extLst>
+              <a:ext uri="{FF2B5EF4-FFF2-40B4-BE49-F238E27FC236}">
+                <a16:creationId xmlns:a16="http://schemas.microsoft.com/office/drawing/2014/main" id="{8EE4EC20-7216-4BAF-88A4-9C229BBB27D6}"/>
+              </a:ext>
+            </a:extLst>
+          </p:cNvPr>
+          <p:cNvSpPr txBox="1"/>
+          <p:nvPr/>
+        </p:nvSpPr>
+        <p:spPr>
+          <a:xfrm>
+            <a:off x="248771" y="1019313"/>
+            <a:ext cx="4047564" cy="4185731"/>
+          </a:xfrm>
+          <a:prstGeom prst="rect">
+            <a:avLst/>
+          </a:prstGeom>
+          <a:noFill/>
+          <a:ln>
+            <a:noFill/>
+          </a:ln>
+        </p:spPr>
+        <p:txBody>
+          <a:bodyPr spcFirstLastPara="1" wrap="square" lIns="91425" tIns="91425" rIns="91425" bIns="91425" anchor="t" anchorCtr="0">
+            <a:spAutoFit/>
+          </a:bodyPr>
+          <a:lstStyle/>
+          <a:p>
+            <a:pPr marL="438150" lvl="0" indent="-285750" algn="l" rtl="0">
+              <a:spcBef>
+                <a:spcPts val="0"/>
+              </a:spcBef>
+              <a:spcAft>
+                <a:spcPts val="600"/>
+              </a:spcAft>
+              <a:buClr>
+                <a:srgbClr val="000000"/>
+              </a:buClr>
+              <a:buSzPts val="1200"/>
+              <a:buFont typeface="Arial" panose="020B0604020202020204" pitchFamily="34" charset="0"/>
+              <a:buChar char="•"/>
+            </a:pPr>
+            <a:r>
+              <a:rPr lang="en-US" sz="1800" dirty="0">
+                <a:latin typeface="Comfortaa"/>
+                <a:ea typeface="Comfortaa"/>
+                <a:cs typeface="Comfortaa"/>
+                <a:sym typeface="Comfortaa"/>
+              </a:rPr>
+              <a:t>Download R: </a:t>
+            </a:r>
+            <a:r>
+              <a:rPr lang="en-US" sz="1800" dirty="0">
+                <a:solidFill>
+                  <a:srgbClr val="00B0F0"/>
+                </a:solidFill>
+                <a:latin typeface="Comfortaa"/>
+                <a:ea typeface="Comfortaa"/>
+                <a:cs typeface="Comfortaa"/>
+                <a:sym typeface="Comfortaa"/>
+                <a:hlinkClick r:id="rId6">
+                  <a:extLst>
+                    <a:ext uri="{A12FA001-AC4F-418D-AE19-62706E023703}">
+                      <ahyp:hlinkClr xmlns:ahyp="http://schemas.microsoft.com/office/drawing/2018/hyperlinkcolor" val="tx"/>
+                    </a:ext>
+                  </a:extLst>
+                </a:hlinkClick>
+              </a:rPr>
+              <a:t>https://repo.miserver.it.umich.edu/cran/</a:t>
+            </a:r>
+            <a:endParaRPr lang="en-US" sz="1800" dirty="0">
+              <a:solidFill>
+                <a:srgbClr val="00B0F0"/>
+              </a:solidFill>
+              <a:latin typeface="Comfortaa"/>
+              <a:ea typeface="Comfortaa"/>
+              <a:cs typeface="Comfortaa"/>
+              <a:sym typeface="Comfortaa"/>
+            </a:endParaRPr>
+          </a:p>
+          <a:p>
+            <a:pPr marL="438150" lvl="0" indent="-285750" algn="l" rtl="0">
+              <a:spcBef>
+                <a:spcPts val="0"/>
+              </a:spcBef>
+              <a:spcAft>
+                <a:spcPts val="600"/>
+              </a:spcAft>
+              <a:buClr>
+                <a:srgbClr val="000000"/>
+              </a:buClr>
+              <a:buSzPts val="1200"/>
+              <a:buFont typeface="Arial" panose="020B0604020202020204" pitchFamily="34" charset="0"/>
+              <a:buChar char="•"/>
+            </a:pPr>
+            <a:r>
+              <a:rPr lang="en-US" sz="1800" dirty="0">
+                <a:latin typeface="Comfortaa"/>
+                <a:ea typeface="Comfortaa"/>
+                <a:cs typeface="Comfortaa"/>
+                <a:sym typeface="Comfortaa"/>
+              </a:rPr>
+              <a:t>Download Anaconda: </a:t>
+            </a:r>
+            <a:r>
+              <a:rPr lang="en-US" sz="1800" dirty="0">
+                <a:solidFill>
+                  <a:srgbClr val="00B0F0"/>
+                </a:solidFill>
+                <a:latin typeface="Comfortaa"/>
+                <a:ea typeface="Comfortaa"/>
+                <a:cs typeface="Comfortaa"/>
+                <a:sym typeface="Comfortaa"/>
+                <a:hlinkClick r:id="rId7">
+                  <a:extLst>
+                    <a:ext uri="{A12FA001-AC4F-418D-AE19-62706E023703}">
+                      <ahyp:hlinkClr xmlns:ahyp="http://schemas.microsoft.com/office/drawing/2018/hyperlinkcolor" val="tx"/>
+                    </a:ext>
+                  </a:extLst>
+                </a:hlinkClick>
+              </a:rPr>
+              <a:t>https://www.anaconda.com/products/individual</a:t>
+            </a:r>
+            <a:endParaRPr lang="en-US" sz="1800" dirty="0">
+              <a:solidFill>
+                <a:srgbClr val="00B0F0"/>
+              </a:solidFill>
+              <a:latin typeface="Comfortaa"/>
+              <a:ea typeface="Comfortaa"/>
+              <a:cs typeface="Comfortaa"/>
+              <a:sym typeface="Comfortaa"/>
+            </a:endParaRPr>
+          </a:p>
+          <a:p>
+            <a:pPr marL="438150" lvl="0" indent="-285750" algn="l" rtl="0">
+              <a:spcBef>
+                <a:spcPts val="0"/>
+              </a:spcBef>
+              <a:spcAft>
+                <a:spcPts val="600"/>
+              </a:spcAft>
+              <a:buClr>
+                <a:srgbClr val="000000"/>
+              </a:buClr>
+              <a:buSzPts val="1200"/>
+              <a:buFont typeface="Arial" panose="020B0604020202020204" pitchFamily="34" charset="0"/>
+              <a:buChar char="•"/>
+            </a:pPr>
+            <a:r>
+              <a:rPr lang="en-US" sz="1800" dirty="0">
+                <a:latin typeface="Comfortaa"/>
+                <a:ea typeface="Comfortaa"/>
+                <a:cs typeface="Comfortaa"/>
+                <a:sym typeface="Comfortaa"/>
+              </a:rPr>
+              <a:t>Instructions to Add R Kernel: </a:t>
+            </a:r>
+            <a:r>
+              <a:rPr lang="en-US" sz="1800" dirty="0">
+                <a:solidFill>
+                  <a:srgbClr val="00B0F0"/>
+                </a:solidFill>
+                <a:latin typeface="Comfortaa"/>
+                <a:ea typeface="Comfortaa"/>
+                <a:cs typeface="Comfortaa"/>
+                <a:sym typeface="Comfortaa"/>
+                <a:hlinkClick r:id="rId8">
+                  <a:extLst>
+                    <a:ext uri="{A12FA001-AC4F-418D-AE19-62706E023703}">
+                      <ahyp:hlinkClr xmlns:ahyp="http://schemas.microsoft.com/office/drawing/2018/hyperlinkcolor" val="tx"/>
+                    </a:ext>
+                  </a:extLst>
+                </a:hlinkClick>
+              </a:rPr>
+              <a:t>https://irkernel.github.io/installation/</a:t>
+            </a:r>
+            <a:endParaRPr lang="en-US" sz="1800" dirty="0">
+              <a:solidFill>
+                <a:srgbClr val="00B0F0"/>
+              </a:solidFill>
+              <a:latin typeface="Comfortaa"/>
+              <a:ea typeface="Comfortaa"/>
+              <a:cs typeface="Comfortaa"/>
+              <a:sym typeface="Comfortaa"/>
+            </a:endParaRPr>
+          </a:p>
+          <a:p>
+            <a:pPr marL="438150" lvl="0" indent="-285750" algn="l" rtl="0">
+              <a:spcBef>
+                <a:spcPts val="0"/>
+              </a:spcBef>
+              <a:spcAft>
+                <a:spcPts val="600"/>
+              </a:spcAft>
+              <a:buClr>
+                <a:srgbClr val="000000"/>
+              </a:buClr>
+              <a:buSzPts val="1200"/>
+              <a:buFont typeface="Arial" panose="020B0604020202020204" pitchFamily="34" charset="0"/>
+              <a:buChar char="•"/>
+            </a:pPr>
+            <a:r>
+              <a:rPr lang="en-US" sz="1800" dirty="0">
+                <a:latin typeface="Comfortaa"/>
+                <a:ea typeface="Comfortaa"/>
+                <a:cs typeface="Comfortaa"/>
+                <a:sym typeface="Comfortaa"/>
+              </a:rPr>
+              <a:t>Download RStudio: </a:t>
+            </a:r>
+            <a:r>
+              <a:rPr lang="en-US" sz="1800" dirty="0">
+                <a:solidFill>
+                  <a:srgbClr val="00B0F0"/>
+                </a:solidFill>
+                <a:latin typeface="Comfortaa"/>
+                <a:ea typeface="Comfortaa"/>
+                <a:cs typeface="Comfortaa"/>
+                <a:sym typeface="Comfortaa"/>
+              </a:rPr>
+              <a:t>https://www.rstudio.com/products/rstudio/</a:t>
+            </a:r>
+          </a:p>
+          <a:p>
+            <a:pPr marL="438150" lvl="0" indent="-285750" algn="l" rtl="0">
+              <a:lnSpc>
+                <a:spcPct val="150000"/>
+              </a:lnSpc>
+              <a:spcBef>
+                <a:spcPts val="0"/>
+              </a:spcBef>
+              <a:spcAft>
+                <a:spcPts val="0"/>
+              </a:spcAft>
+              <a:buClr>
+                <a:srgbClr val="000000"/>
+              </a:buClr>
+              <a:buSzPts val="1200"/>
+              <a:buFont typeface="Arial" panose="020B0604020202020204" pitchFamily="34" charset="0"/>
+              <a:buChar char="•"/>
+            </a:pPr>
+            <a:endParaRPr lang="en-US" sz="1600" dirty="0">
+              <a:solidFill>
+                <a:srgbClr val="00B0F0"/>
+              </a:solidFill>
+              <a:latin typeface="Comfortaa"/>
+              <a:ea typeface="Comfortaa"/>
+              <a:cs typeface="Comfortaa"/>
+              <a:sym typeface="Comfortaa"/>
+            </a:endParaRPr>
+          </a:p>
+        </p:txBody>
+      </p:sp>
+    </p:spTree>
+    <p:extLst>
+      <p:ext uri="{BB962C8B-B14F-4D97-AF65-F5344CB8AC3E}">
+        <p14:creationId xmlns:p14="http://schemas.microsoft.com/office/powerpoint/2010/main" val="3918057294"/>
+      </p:ext>
+    </p:extLst>
+  </p:cSld>
+  <p:clrMapOvr>
+    <a:masterClrMapping/>
+  </p:clrMapOvr>
+</p:sld>
+</file>
+
+<file path=ppt/slides/slide8.xml><?xml version="1.0" encoding="utf-8"?>
 <p:sld xmlns:a="http://schemas.openxmlformats.org/drawingml/2006/main" xmlns:r="http://schemas.openxmlformats.org/officeDocument/2006/relationships" xmlns:p="http://schemas.openxmlformats.org/presentationml/2006/main">
   <p:cSld>
     <p:spTree>

</xml_diff>